<commit_message>
Complete to write Preintegration part
</commit_message>
<xml_diff>
--- a/img/preintegration/preintegration_v2.pptx
+++ b/img/preintegration/preintegration_v2.pptx
@@ -16,8 +16,9 @@
     <p:sldId id="262" r:id="rId10"/>
     <p:sldId id="263" r:id="rId11"/>
     <p:sldId id="267" r:id="rId12"/>
-    <p:sldId id="268" r:id="rId13"/>
-    <p:sldId id="261" r:id="rId14"/>
+    <p:sldId id="269" r:id="rId13"/>
+    <p:sldId id="268" r:id="rId14"/>
+    <p:sldId id="261" r:id="rId15"/>
   </p:sldIdLst>
   <p:sldSz cx="12192000" cy="6858000"/>
   <p:notesSz cx="6858000" cy="9144000"/>
@@ -288,7 +289,7 @@
           <a:p>
             <a:fld id="{B79B8510-7E7F-4140-B929-CF74CD005B44}" type="datetimeFigureOut">
               <a:rPr lang="ko-KR" altLang="en-US" smtClean="0"/>
-              <a:t>2022-04-11</a:t>
+              <a:t>2022. 4. 13.</a:t>
             </a:fld>
             <a:endParaRPr lang="ko-KR" altLang="en-US"/>
           </a:p>
@@ -486,7 +487,7 @@
           <a:p>
             <a:fld id="{B79B8510-7E7F-4140-B929-CF74CD005B44}" type="datetimeFigureOut">
               <a:rPr lang="ko-KR" altLang="en-US" smtClean="0"/>
-              <a:t>2022-04-11</a:t>
+              <a:t>2022. 4. 13.</a:t>
             </a:fld>
             <a:endParaRPr lang="ko-KR" altLang="en-US"/>
           </a:p>
@@ -694,7 +695,7 @@
           <a:p>
             <a:fld id="{B79B8510-7E7F-4140-B929-CF74CD005B44}" type="datetimeFigureOut">
               <a:rPr lang="ko-KR" altLang="en-US" smtClean="0"/>
-              <a:t>2022-04-11</a:t>
+              <a:t>2022. 4. 13.</a:t>
             </a:fld>
             <a:endParaRPr lang="ko-KR" altLang="en-US"/>
           </a:p>
@@ -930,7 +931,7 @@
           <a:p>
             <a:fld id="{B79B8510-7E7F-4140-B929-CF74CD005B44}" type="datetimeFigureOut">
               <a:rPr lang="ko-KR" altLang="en-US" smtClean="0"/>
-              <a:t>2022-04-11</a:t>
+              <a:t>2022. 4. 13.</a:t>
             </a:fld>
             <a:endParaRPr lang="ko-KR" altLang="en-US"/>
           </a:p>
@@ -1205,7 +1206,7 @@
           <a:p>
             <a:fld id="{B79B8510-7E7F-4140-B929-CF74CD005B44}" type="datetimeFigureOut">
               <a:rPr lang="ko-KR" altLang="en-US" smtClean="0"/>
-              <a:t>2022-04-11</a:t>
+              <a:t>2022. 4. 13.</a:t>
             </a:fld>
             <a:endParaRPr lang="ko-KR" altLang="en-US"/>
           </a:p>
@@ -1470,7 +1471,7 @@
           <a:p>
             <a:fld id="{B79B8510-7E7F-4140-B929-CF74CD005B44}" type="datetimeFigureOut">
               <a:rPr lang="ko-KR" altLang="en-US" smtClean="0"/>
-              <a:t>2022-04-11</a:t>
+              <a:t>2022. 4. 13.</a:t>
             </a:fld>
             <a:endParaRPr lang="ko-KR" altLang="en-US"/>
           </a:p>
@@ -1882,7 +1883,7 @@
           <a:p>
             <a:fld id="{B79B8510-7E7F-4140-B929-CF74CD005B44}" type="datetimeFigureOut">
               <a:rPr lang="ko-KR" altLang="en-US" smtClean="0"/>
-              <a:t>2022-04-11</a:t>
+              <a:t>2022. 4. 13.</a:t>
             </a:fld>
             <a:endParaRPr lang="ko-KR" altLang="en-US"/>
           </a:p>
@@ -2023,7 +2024,7 @@
           <a:p>
             <a:fld id="{B79B8510-7E7F-4140-B929-CF74CD005B44}" type="datetimeFigureOut">
               <a:rPr lang="ko-KR" altLang="en-US" smtClean="0"/>
-              <a:t>2022-04-11</a:t>
+              <a:t>2022. 4. 13.</a:t>
             </a:fld>
             <a:endParaRPr lang="ko-KR" altLang="en-US"/>
           </a:p>
@@ -2136,7 +2137,7 @@
           <a:p>
             <a:fld id="{B79B8510-7E7F-4140-B929-CF74CD005B44}" type="datetimeFigureOut">
               <a:rPr lang="ko-KR" altLang="en-US" smtClean="0"/>
-              <a:t>2022-04-11</a:t>
+              <a:t>2022. 4. 13.</a:t>
             </a:fld>
             <a:endParaRPr lang="ko-KR" altLang="en-US"/>
           </a:p>
@@ -2447,7 +2448,7 @@
           <a:p>
             <a:fld id="{B79B8510-7E7F-4140-B929-CF74CD005B44}" type="datetimeFigureOut">
               <a:rPr lang="ko-KR" altLang="en-US" smtClean="0"/>
-              <a:t>2022-04-11</a:t>
+              <a:t>2022. 4. 13.</a:t>
             </a:fld>
             <a:endParaRPr lang="ko-KR" altLang="en-US"/>
           </a:p>
@@ -2735,7 +2736,7 @@
           <a:p>
             <a:fld id="{B79B8510-7E7F-4140-B929-CF74CD005B44}" type="datetimeFigureOut">
               <a:rPr lang="ko-KR" altLang="en-US" smtClean="0"/>
-              <a:t>2022-04-11</a:t>
+              <a:t>2022. 4. 13.</a:t>
             </a:fld>
             <a:endParaRPr lang="ko-KR" altLang="en-US"/>
           </a:p>
@@ -2976,7 +2977,7 @@
           <a:p>
             <a:fld id="{B79B8510-7E7F-4140-B929-CF74CD005B44}" type="datetimeFigureOut">
               <a:rPr lang="ko-KR" altLang="en-US" smtClean="0"/>
-              <a:t>2022-04-11</a:t>
+              <a:t>2022. 4. 13.</a:t>
             </a:fld>
             <a:endParaRPr lang="ko-KR" altLang="en-US"/>
           </a:p>
@@ -4927,6 +4928,245 @@
 </file>
 
 <file path=ppt/slides/slide12.xml><?xml version="1.0" encoding="utf-8"?>
+<p:sld xmlns:a="http://schemas.openxmlformats.org/drawingml/2006/main" xmlns:r="http://schemas.openxmlformats.org/officeDocument/2006/relationships" xmlns:p="http://schemas.openxmlformats.org/presentationml/2006/main">
+  <p:cSld>
+    <p:spTree>
+      <p:nvGrpSpPr>
+        <p:cNvPr id="1" name=""/>
+        <p:cNvGrpSpPr/>
+        <p:nvPr/>
+      </p:nvGrpSpPr>
+      <p:grpSpPr>
+        <a:xfrm>
+          <a:off x="0" y="0"/>
+          <a:ext cx="0" cy="0"/>
+          <a:chOff x="0" y="0"/>
+          <a:chExt cx="0" cy="0"/>
+        </a:xfrm>
+      </p:grpSpPr>
+      <p:grpSp>
+        <p:nvGrpSpPr>
+          <p:cNvPr id="6" name="Group 5">
+            <a:extLst>
+              <a:ext uri="{FF2B5EF4-FFF2-40B4-BE49-F238E27FC236}">
+                <a16:creationId xmlns:a16="http://schemas.microsoft.com/office/drawing/2014/main" id="{F763461B-46D0-4440-99D3-0E0D2D106710}"/>
+              </a:ext>
+            </a:extLst>
+          </p:cNvPr>
+          <p:cNvGrpSpPr/>
+          <p:nvPr/>
+        </p:nvGrpSpPr>
+        <p:grpSpPr>
+          <a:xfrm>
+            <a:off x="301498" y="1272209"/>
+            <a:ext cx="11890502" cy="2842592"/>
+            <a:chOff x="301498" y="1272209"/>
+            <a:chExt cx="11890502" cy="2842592"/>
+          </a:xfrm>
+        </p:grpSpPr>
+        <p:pic>
+          <p:nvPicPr>
+            <p:cNvPr id="2" name="Picture 1">
+              <a:extLst>
+                <a:ext uri="{FF2B5EF4-FFF2-40B4-BE49-F238E27FC236}">
+                  <a16:creationId xmlns:a16="http://schemas.microsoft.com/office/drawing/2014/main" id="{CD31DDC7-ED14-1145-8BD1-3810BFACA84E}"/>
+                </a:ext>
+              </a:extLst>
+            </p:cNvPr>
+            <p:cNvPicPr>
+              <a:picLocks noChangeAspect="1"/>
+            </p:cNvPicPr>
+            <p:nvPr/>
+          </p:nvPicPr>
+          <p:blipFill>
+            <a:blip r:embed="rId2"/>
+            <a:stretch>
+              <a:fillRect/>
+            </a:stretch>
+          </p:blipFill>
+          <p:spPr>
+            <a:xfrm>
+              <a:off x="301498" y="1272209"/>
+              <a:ext cx="11890502" cy="2842592"/>
+            </a:xfrm>
+            <a:prstGeom prst="rect">
+              <a:avLst/>
+            </a:prstGeom>
+          </p:spPr>
+        </p:pic>
+        <p:sp>
+          <p:nvSpPr>
+            <p:cNvPr id="3" name="Rectangle 2">
+              <a:extLst>
+                <a:ext uri="{FF2B5EF4-FFF2-40B4-BE49-F238E27FC236}">
+                  <a16:creationId xmlns:a16="http://schemas.microsoft.com/office/drawing/2014/main" id="{470F524E-F9C6-2448-AD85-6412CBFCE4E2}"/>
+                </a:ext>
+              </a:extLst>
+            </p:cNvPr>
+            <p:cNvSpPr/>
+            <p:nvPr/>
+          </p:nvSpPr>
+          <p:spPr>
+            <a:xfrm>
+              <a:off x="4128955" y="1399265"/>
+              <a:ext cx="1078245" cy="567524"/>
+            </a:xfrm>
+            <a:prstGeom prst="rect">
+              <a:avLst/>
+            </a:prstGeom>
+            <a:noFill/>
+            <a:ln w="28575">
+              <a:solidFill>
+                <a:srgbClr val="00B050"/>
+              </a:solidFill>
+            </a:ln>
+          </p:spPr>
+          <p:style>
+            <a:lnRef idx="2">
+              <a:schemeClr val="accent1">
+                <a:shade val="50000"/>
+              </a:schemeClr>
+            </a:lnRef>
+            <a:fillRef idx="1">
+              <a:schemeClr val="accent1"/>
+            </a:fillRef>
+            <a:effectRef idx="0">
+              <a:schemeClr val="accent1"/>
+            </a:effectRef>
+            <a:fontRef idx="minor">
+              <a:schemeClr val="lt1"/>
+            </a:fontRef>
+          </p:style>
+          <p:txBody>
+            <a:bodyPr rtlCol="0" anchor="ctr"/>
+            <a:lstStyle/>
+            <a:p>
+              <a:pPr algn="ctr"/>
+              <a:endParaRPr lang="en-KR"/>
+            </a:p>
+          </p:txBody>
+        </p:sp>
+        <p:sp>
+          <p:nvSpPr>
+            <p:cNvPr id="4" name="Rectangle 3">
+              <a:extLst>
+                <a:ext uri="{FF2B5EF4-FFF2-40B4-BE49-F238E27FC236}">
+                  <a16:creationId xmlns:a16="http://schemas.microsoft.com/office/drawing/2014/main" id="{0DA80A05-FCE1-B046-AC6F-D29F5EDCF1EA}"/>
+                </a:ext>
+              </a:extLst>
+            </p:cNvPr>
+            <p:cNvSpPr/>
+            <p:nvPr/>
+          </p:nvSpPr>
+          <p:spPr>
+            <a:xfrm>
+              <a:off x="6636068" y="2120271"/>
+              <a:ext cx="1032147" cy="739712"/>
+            </a:xfrm>
+            <a:prstGeom prst="rect">
+              <a:avLst/>
+            </a:prstGeom>
+            <a:noFill/>
+            <a:ln w="28575">
+              <a:solidFill>
+                <a:srgbClr val="00B050"/>
+              </a:solidFill>
+              <a:prstDash val="solid"/>
+            </a:ln>
+          </p:spPr>
+          <p:style>
+            <a:lnRef idx="2">
+              <a:schemeClr val="accent1">
+                <a:shade val="50000"/>
+              </a:schemeClr>
+            </a:lnRef>
+            <a:fillRef idx="1">
+              <a:schemeClr val="accent1"/>
+            </a:fillRef>
+            <a:effectRef idx="0">
+              <a:schemeClr val="accent1"/>
+            </a:effectRef>
+            <a:fontRef idx="minor">
+              <a:schemeClr val="lt1"/>
+            </a:fontRef>
+          </p:style>
+          <p:txBody>
+            <a:bodyPr rtlCol="0" anchor="ctr"/>
+            <a:lstStyle/>
+            <a:p>
+              <a:pPr algn="ctr"/>
+              <a:endParaRPr lang="en-KR"/>
+            </a:p>
+          </p:txBody>
+        </p:sp>
+        <p:sp>
+          <p:nvSpPr>
+            <p:cNvPr id="5" name="Rectangle 4">
+              <a:extLst>
+                <a:ext uri="{FF2B5EF4-FFF2-40B4-BE49-F238E27FC236}">
+                  <a16:creationId xmlns:a16="http://schemas.microsoft.com/office/drawing/2014/main" id="{3E6677DA-443B-EC44-A7B4-7581580B768A}"/>
+                </a:ext>
+              </a:extLst>
+            </p:cNvPr>
+            <p:cNvSpPr/>
+            <p:nvPr/>
+          </p:nvSpPr>
+          <p:spPr>
+            <a:xfrm>
+              <a:off x="9649552" y="3162447"/>
+              <a:ext cx="1032147" cy="739712"/>
+            </a:xfrm>
+            <a:prstGeom prst="rect">
+              <a:avLst/>
+            </a:prstGeom>
+            <a:noFill/>
+            <a:ln w="28575">
+              <a:solidFill>
+                <a:srgbClr val="00B050"/>
+              </a:solidFill>
+              <a:prstDash val="solid"/>
+            </a:ln>
+          </p:spPr>
+          <p:style>
+            <a:lnRef idx="2">
+              <a:schemeClr val="accent1">
+                <a:shade val="50000"/>
+              </a:schemeClr>
+            </a:lnRef>
+            <a:fillRef idx="1">
+              <a:schemeClr val="accent1"/>
+            </a:fillRef>
+            <a:effectRef idx="0">
+              <a:schemeClr val="accent1"/>
+            </a:effectRef>
+            <a:fontRef idx="minor">
+              <a:schemeClr val="lt1"/>
+            </a:fontRef>
+          </p:style>
+          <p:txBody>
+            <a:bodyPr rtlCol="0" anchor="ctr"/>
+            <a:lstStyle/>
+            <a:p>
+              <a:pPr algn="ctr"/>
+              <a:endParaRPr lang="en-KR"/>
+            </a:p>
+          </p:txBody>
+        </p:sp>
+      </p:grpSp>
+    </p:spTree>
+    <p:extLst>
+      <p:ext uri="{BB962C8B-B14F-4D97-AF65-F5344CB8AC3E}">
+        <p14:creationId xmlns:p14="http://schemas.microsoft.com/office/powerpoint/2010/main" val="380220341"/>
+      </p:ext>
+    </p:extLst>
+  </p:cSld>
+  <p:clrMapOvr>
+    <a:masterClrMapping/>
+  </p:clrMapOvr>
+</p:sld>
+</file>
+
+<file path=ppt/slides/slide13.xml><?xml version="1.0" encoding="utf-8"?>
 <p:sld xmlns:a="http://schemas.openxmlformats.org/drawingml/2006/main" xmlns:r="http://schemas.openxmlformats.org/officeDocument/2006/relationships" xmlns:p="http://schemas.openxmlformats.org/presentationml/2006/main">
   <p:cSld>
     <p:spTree>
@@ -7002,7 +7242,7 @@
 </p:sld>
 </file>
 
-<file path=ppt/slides/slide13.xml><?xml version="1.0" encoding="utf-8"?>
+<file path=ppt/slides/slide14.xml><?xml version="1.0" encoding="utf-8"?>
 <p:sld xmlns:a="http://schemas.openxmlformats.org/drawingml/2006/main" xmlns:r="http://schemas.openxmlformats.org/officeDocument/2006/relationships" xmlns:p="http://schemas.openxmlformats.org/presentationml/2006/main">
   <p:cSld>
     <p:spTree>

</xml_diff>